<commit_message>
add course schedule to course overview slides
</commit_message>
<xml_diff>
--- a/Class1/course_overview_presentation.pptx
+++ b/Class1/course_overview_presentation.pptx
@@ -33233,10 +33233,9 @@
           <a:lstStyle/>
           <a:p>
             <a:r>
-              <a:rPr lang="en-US" sz="3500"/>
-              <a:t>Couse Schedule</a:t>
+              <a:rPr lang="en-US" sz="3500" dirty="0"/>
+              <a:t>Course Schedule</a:t>
             </a:r>
-            <a:endParaRPr lang="en-US" sz="3500" dirty="0"/>
           </a:p>
         </p:txBody>
       </p:sp>
@@ -33920,7 +33919,7 @@
           <a:p>
             <a:r>
               <a:rPr lang="en-US" sz="3500" dirty="0"/>
-              <a:t>Couse Schedule</a:t>
+              <a:t>Course Schedule</a:t>
             </a:r>
           </a:p>
         </p:txBody>
@@ -35140,7 +35139,7 @@
           <a:p>
             <a:r>
               <a:rPr lang="en-US" sz="3500" dirty="0"/>
-              <a:t>Couse Schedule</a:t>
+              <a:t>Course Schedule</a:t>
             </a:r>
           </a:p>
         </p:txBody>
@@ -35180,7 +35179,6 @@
               <a:rPr lang="en-US" sz="1700" dirty="0"/>
               <a:t>Weeks 8–10: Course Project &amp; Wrap-up</a:t>
             </a:r>
-            <a:endParaRPr lang="en-US" sz="1700"/>
           </a:p>
         </p:txBody>
       </p:sp>

</xml_diff>

<commit_message>
'updates week 1 & Week 4 slides
</commit_message>
<xml_diff>
--- a/Class1/course_overview_presentation.pptx
+++ b/Class1/course_overview_presentation.pptx
@@ -5,7 +5,7 @@
     <p:sldMasterId id="2147483648" r:id="rId1"/>
   </p:sldMasterIdLst>
   <p:notesMasterIdLst>
-    <p:notesMasterId r:id="rId22"/>
+    <p:notesMasterId r:id="rId24"/>
   </p:notesMasterIdLst>
   <p:sldIdLst>
     <p:sldId id="256" r:id="rId2"/>
@@ -26,8 +26,10 @@
     <p:sldId id="268" r:id="rId17"/>
     <p:sldId id="269" r:id="rId18"/>
     <p:sldId id="270" r:id="rId19"/>
-    <p:sldId id="271" r:id="rId20"/>
-    <p:sldId id="272" r:id="rId21"/>
+    <p:sldId id="276" r:id="rId20"/>
+    <p:sldId id="277" r:id="rId21"/>
+    <p:sldId id="271" r:id="rId22"/>
+    <p:sldId id="272" r:id="rId23"/>
   </p:sldIdLst>
   <p:sldSz cx="9144000" cy="6858000" type="screen4x3"/>
   <p:notesSz cx="6858000" cy="9144000"/>
@@ -23124,7 +23126,7 @@
           <a:p>
             <a:fld id="{CF15D50D-8C19-874F-B33F-6BB99EC3D6BF}" type="datetimeFigureOut">
               <a:rPr lang="en-US" smtClean="0"/>
-              <a:t>5/19/25</a:t>
+              <a:t>5/24/25</a:t>
             </a:fld>
             <a:endParaRPr lang="en-US"/>
           </a:p>
@@ -23909,6 +23911,90 @@
     <p:extLst>
       <p:ext uri="{BB962C8B-B14F-4D97-AF65-F5344CB8AC3E}">
         <p14:creationId xmlns:p14="http://schemas.microsoft.com/office/powerpoint/2010/main" val="3720283975"/>
+      </p:ext>
+    </p:extLst>
+  </p:cSld>
+  <p:clrMapOvr>
+    <a:masterClrMapping/>
+  </p:clrMapOvr>
+</p:notes>
+</file>
+
+<file path=ppt/notesSlides/notesSlide14.xml><?xml version="1.0" encoding="utf-8"?>
+<p:notes xmlns:a="http://schemas.openxmlformats.org/drawingml/2006/main" xmlns:r="http://schemas.openxmlformats.org/officeDocument/2006/relationships" xmlns:p="http://schemas.openxmlformats.org/presentationml/2006/main">
+  <p:cSld>
+    <p:spTree>
+      <p:nvGrpSpPr>
+        <p:cNvPr id="1" name=""/>
+        <p:cNvGrpSpPr/>
+        <p:nvPr/>
+      </p:nvGrpSpPr>
+      <p:grpSpPr>
+        <a:xfrm>
+          <a:off x="0" y="0"/>
+          <a:ext cx="0" cy="0"/>
+          <a:chOff x="0" y="0"/>
+          <a:chExt cx="0" cy="0"/>
+        </a:xfrm>
+      </p:grpSpPr>
+      <p:sp>
+        <p:nvSpPr>
+          <p:cNvPr id="2" name="Slide Image Placeholder 1"/>
+          <p:cNvSpPr>
+            <a:spLocks noGrp="1" noRot="1" noChangeAspect="1"/>
+          </p:cNvSpPr>
+          <p:nvPr>
+            <p:ph type="sldImg"/>
+          </p:nvPr>
+        </p:nvSpPr>
+        <p:spPr/>
+      </p:sp>
+      <p:sp>
+        <p:nvSpPr>
+          <p:cNvPr id="3" name="Notes Placeholder 2"/>
+          <p:cNvSpPr>
+            <a:spLocks noGrp="1"/>
+          </p:cNvSpPr>
+          <p:nvPr>
+            <p:ph type="body" idx="1"/>
+          </p:nvPr>
+        </p:nvSpPr>
+        <p:spPr/>
+        <p:txBody>
+          <a:bodyPr/>
+          <a:lstStyle/>
+          <a:p>
+            <a:endParaRPr lang="en-US" dirty="0"/>
+          </a:p>
+        </p:txBody>
+      </p:sp>
+      <p:sp>
+        <p:nvSpPr>
+          <p:cNvPr id="4" name="Slide Number Placeholder 3"/>
+          <p:cNvSpPr>
+            <a:spLocks noGrp="1"/>
+          </p:cNvSpPr>
+          <p:nvPr>
+            <p:ph type="sldNum" sz="quarter" idx="5"/>
+          </p:nvPr>
+        </p:nvSpPr>
+        <p:spPr/>
+        <p:txBody>
+          <a:bodyPr/>
+          <a:lstStyle/>
+          <a:p>
+            <a:fld id="{3B0E0538-2EA7-5546-A301-25D82D1A8F3A}" type="slidenum">
+              <a:rPr lang="en-US" smtClean="0"/>
+              <a:t>19</a:t>
+            </a:fld>
+            <a:endParaRPr lang="en-US"/>
+          </a:p>
+        </p:txBody>
+      </p:sp>
+    </p:spTree>
+    <p:extLst>
+      <p:ext uri="{BB962C8B-B14F-4D97-AF65-F5344CB8AC3E}">
+        <p14:creationId xmlns:p14="http://schemas.microsoft.com/office/powerpoint/2010/main" val="3285642823"/>
       </p:ext>
     </p:extLst>
   </p:cSld>
@@ -24852,7 +24938,7 @@
           <a:p>
             <a:fld id="{5BCAD085-E8A6-8845-BD4E-CB4CCA059FC4}" type="datetimeFigureOut">
               <a:rPr lang="en-US" smtClean="0"/>
-              <a:t>5/19/25</a:t>
+              <a:t>5/24/25</a:t>
             </a:fld>
             <a:endParaRPr lang="en-US"/>
           </a:p>
@@ -25020,7 +25106,7 @@
           <a:p>
             <a:fld id="{5BCAD085-E8A6-8845-BD4E-CB4CCA059FC4}" type="datetimeFigureOut">
               <a:rPr lang="en-US" smtClean="0"/>
-              <a:t>5/19/25</a:t>
+              <a:t>5/24/25</a:t>
             </a:fld>
             <a:endParaRPr lang="en-US"/>
           </a:p>
@@ -25198,7 +25284,7 @@
           <a:p>
             <a:fld id="{5BCAD085-E8A6-8845-BD4E-CB4CCA059FC4}" type="datetimeFigureOut">
               <a:rPr lang="en-US" smtClean="0"/>
-              <a:t>5/19/25</a:t>
+              <a:t>5/24/25</a:t>
             </a:fld>
             <a:endParaRPr lang="en-US"/>
           </a:p>
@@ -25366,7 +25452,7 @@
           <a:p>
             <a:fld id="{5BCAD085-E8A6-8845-BD4E-CB4CCA059FC4}" type="datetimeFigureOut">
               <a:rPr lang="en-US" smtClean="0"/>
-              <a:t>5/19/25</a:t>
+              <a:t>5/24/25</a:t>
             </a:fld>
             <a:endParaRPr lang="en-US"/>
           </a:p>
@@ -25611,7 +25697,7 @@
           <a:p>
             <a:fld id="{5BCAD085-E8A6-8845-BD4E-CB4CCA059FC4}" type="datetimeFigureOut">
               <a:rPr lang="en-US" smtClean="0"/>
-              <a:t>5/19/25</a:t>
+              <a:t>5/24/25</a:t>
             </a:fld>
             <a:endParaRPr lang="en-US"/>
           </a:p>
@@ -25896,7 +25982,7 @@
           <a:p>
             <a:fld id="{5BCAD085-E8A6-8845-BD4E-CB4CCA059FC4}" type="datetimeFigureOut">
               <a:rPr lang="en-US" smtClean="0"/>
-              <a:t>5/19/25</a:t>
+              <a:t>5/24/25</a:t>
             </a:fld>
             <a:endParaRPr lang="en-US"/>
           </a:p>
@@ -26315,7 +26401,7 @@
           <a:p>
             <a:fld id="{5BCAD085-E8A6-8845-BD4E-CB4CCA059FC4}" type="datetimeFigureOut">
               <a:rPr lang="en-US" smtClean="0"/>
-              <a:t>5/19/25</a:t>
+              <a:t>5/24/25</a:t>
             </a:fld>
             <a:endParaRPr lang="en-US"/>
           </a:p>
@@ -26432,7 +26518,7 @@
           <a:p>
             <a:fld id="{5BCAD085-E8A6-8845-BD4E-CB4CCA059FC4}" type="datetimeFigureOut">
               <a:rPr lang="en-US" smtClean="0"/>
-              <a:t>5/19/25</a:t>
+              <a:t>5/24/25</a:t>
             </a:fld>
             <a:endParaRPr lang="en-US"/>
           </a:p>
@@ -26527,7 +26613,7 @@
           <a:p>
             <a:fld id="{5BCAD085-E8A6-8845-BD4E-CB4CCA059FC4}" type="datetimeFigureOut">
               <a:rPr lang="en-US" smtClean="0"/>
-              <a:t>5/19/25</a:t>
+              <a:t>5/24/25</a:t>
             </a:fld>
             <a:endParaRPr lang="en-US"/>
           </a:p>
@@ -26802,7 +26888,7 @@
           <a:p>
             <a:fld id="{5BCAD085-E8A6-8845-BD4E-CB4CCA059FC4}" type="datetimeFigureOut">
               <a:rPr lang="en-US" smtClean="0"/>
-              <a:t>5/19/25</a:t>
+              <a:t>5/24/25</a:t>
             </a:fld>
             <a:endParaRPr lang="en-US"/>
           </a:p>
@@ -27054,7 +27140,7 @@
           <a:p>
             <a:fld id="{5BCAD085-E8A6-8845-BD4E-CB4CCA059FC4}" type="datetimeFigureOut">
               <a:rPr lang="en-US" smtClean="0"/>
-              <a:t>5/19/25</a:t>
+              <a:t>5/24/25</a:t>
             </a:fld>
             <a:endParaRPr lang="en-US"/>
           </a:p>
@@ -27265,7 +27351,7 @@
           <a:p>
             <a:fld id="{5BCAD085-E8A6-8845-BD4E-CB4CCA059FC4}" type="datetimeFigureOut">
               <a:rPr lang="en-US" smtClean="0"/>
-              <a:t>5/19/25</a:t>
+              <a:t>5/24/25</a:t>
             </a:fld>
             <a:endParaRPr lang="en-US"/>
           </a:p>
@@ -32287,6 +32373,1083 @@
       </p:grpSpPr>
       <p:sp useBgFill="1">
         <p:nvSpPr>
+          <p:cNvPr id="9" name="Rectangle 8">
+            <a:extLst>
+              <a:ext uri="{FF2B5EF4-FFF2-40B4-BE49-F238E27FC236}">
+                <a16:creationId xmlns:a16="http://schemas.microsoft.com/office/drawing/2014/main" id="{BACC6370-2D7E-4714-9D71-7542949D7D5D}"/>
+              </a:ext>
+              <a:ext uri="{C183D7F6-B498-43B3-948B-1728B52AA6E4}">
+                <adec:decorative xmlns:adec="http://schemas.microsoft.com/office/drawing/2017/decorative" val="1"/>
+              </a:ext>
+            </a:extLst>
+          </p:cNvPr>
+          <p:cNvSpPr>
+            <a:spLocks noGrp="1" noRot="1" noChangeAspect="1" noMove="1" noResize="1" noEditPoints="1" noAdjustHandles="1" noChangeArrowheads="1" noChangeShapeType="1" noTextEdit="1"/>
+          </p:cNvSpPr>
+          <p:nvPr>
+            <p:extLst>
+              <p:ext uri="{386F3935-93C4-4BCD-93E2-E3B085C9AB24}">
+                <p16:designElem xmlns:p16="http://schemas.microsoft.com/office/powerpoint/2015/main" val="1"/>
+              </p:ext>
+            </p:extLst>
+          </p:nvPr>
+        </p:nvSpPr>
+        <p:spPr>
+          <a:xfrm>
+            <a:off x="0" y="0"/>
+            <a:ext cx="9144000" cy="6858000"/>
+          </a:xfrm>
+          <a:prstGeom prst="rect">
+            <a:avLst/>
+          </a:prstGeom>
+          <a:ln w="12700" cap="flat" cmpd="sng" algn="ctr">
+            <a:noFill/>
+            <a:prstDash val="solid"/>
+            <a:miter lim="800000"/>
+          </a:ln>
+          <a:effectLst/>
+          <a:extLst>
+            <a:ext uri="{91240B29-F687-4F45-9708-019B960494DF}">
+              <a14:hiddenLine xmlns:a14="http://schemas.microsoft.com/office/drawing/2010/main" w="12700" cap="flat" cmpd="sng" algn="ctr">
+                <a:solidFill>
+                  <a:schemeClr val="accent1">
+                    <a:shade val="50000"/>
+                  </a:schemeClr>
+                </a:solidFill>
+                <a:prstDash val="solid"/>
+                <a:miter lim="800000"/>
+              </a14:hiddenLine>
+            </a:ext>
+          </a:extLst>
+        </p:spPr>
+        <p:style>
+          <a:lnRef idx="2">
+            <a:schemeClr val="accent1">
+              <a:shade val="50000"/>
+            </a:schemeClr>
+          </a:lnRef>
+          <a:fillRef idx="1">
+            <a:schemeClr val="accent1"/>
+          </a:fillRef>
+          <a:effectRef idx="0">
+            <a:schemeClr val="accent1"/>
+          </a:effectRef>
+          <a:fontRef idx="minor">
+            <a:schemeClr val="lt1"/>
+          </a:fontRef>
+        </p:style>
+        <p:txBody>
+          <a:bodyPr rtlCol="0" anchor="ctr"/>
+          <a:lstStyle/>
+          <a:p>
+            <a:pPr algn="ctr"/>
+            <a:endParaRPr lang="en-US"/>
+          </a:p>
+        </p:txBody>
+      </p:sp>
+      <p:sp>
+        <p:nvSpPr>
+          <p:cNvPr id="11" name="Rectangle 10">
+            <a:extLst>
+              <a:ext uri="{FF2B5EF4-FFF2-40B4-BE49-F238E27FC236}">
+                <a16:creationId xmlns:a16="http://schemas.microsoft.com/office/drawing/2014/main" id="{F68B3F68-107C-434F-AA38-110D5EA91B85}"/>
+              </a:ext>
+              <a:ext uri="{C183D7F6-B498-43B3-948B-1728B52AA6E4}">
+                <adec:decorative xmlns:adec="http://schemas.microsoft.com/office/drawing/2017/decorative" val="1"/>
+              </a:ext>
+            </a:extLst>
+          </p:cNvPr>
+          <p:cNvSpPr>
+            <a:spLocks noGrp="1" noRot="1" noChangeAspect="1" noMove="1" noResize="1" noEditPoints="1" noAdjustHandles="1" noChangeArrowheads="1" noChangeShapeType="1" noTextEdit="1"/>
+          </p:cNvSpPr>
+          <p:nvPr>
+            <p:extLst>
+              <p:ext uri="{386F3935-93C4-4BCD-93E2-E3B085C9AB24}">
+                <p16:designElem xmlns:p16="http://schemas.microsoft.com/office/powerpoint/2015/main" val="1"/>
+              </p:ext>
+            </p:extLst>
+          </p:nvPr>
+        </p:nvSpPr>
+        <p:spPr>
+          <a:xfrm flipH="1">
+            <a:off x="1" y="0"/>
+            <a:ext cx="9143999" cy="1575955"/>
+          </a:xfrm>
+          <a:prstGeom prst="rect">
+            <a:avLst/>
+          </a:prstGeom>
+          <a:gradFill>
+            <a:gsLst>
+              <a:gs pos="0">
+                <a:srgbClr val="000000">
+                  <a:alpha val="96000"/>
+                </a:srgbClr>
+              </a:gs>
+              <a:gs pos="100000">
+                <a:schemeClr val="accent1">
+                  <a:lumMod val="75000"/>
+                </a:schemeClr>
+              </a:gs>
+            </a:gsLst>
+            <a:lin ang="8400000" scaled="0"/>
+          </a:gradFill>
+          <a:ln>
+            <a:noFill/>
+          </a:ln>
+        </p:spPr>
+        <p:style>
+          <a:lnRef idx="2">
+            <a:schemeClr val="accent1">
+              <a:shade val="50000"/>
+            </a:schemeClr>
+          </a:lnRef>
+          <a:fillRef idx="1">
+            <a:schemeClr val="accent1"/>
+          </a:fillRef>
+          <a:effectRef idx="0">
+            <a:schemeClr val="accent1"/>
+          </a:effectRef>
+          <a:fontRef idx="minor">
+            <a:schemeClr val="lt1"/>
+          </a:fontRef>
+        </p:style>
+        <p:txBody>
+          <a:bodyPr rtlCol="0" anchor="ctr"/>
+          <a:lstStyle/>
+          <a:p>
+            <a:pPr algn="ctr"/>
+            <a:endParaRPr lang="en-US"/>
+          </a:p>
+        </p:txBody>
+      </p:sp>
+      <p:sp>
+        <p:nvSpPr>
+          <p:cNvPr id="13" name="Rectangle 12">
+            <a:extLst>
+              <a:ext uri="{FF2B5EF4-FFF2-40B4-BE49-F238E27FC236}">
+                <a16:creationId xmlns:a16="http://schemas.microsoft.com/office/drawing/2014/main" id="{AAD0DBB9-1A4B-4391-81D4-CB19F9AB918A}"/>
+              </a:ext>
+              <a:ext uri="{C183D7F6-B498-43B3-948B-1728B52AA6E4}">
+                <adec:decorative xmlns:adec="http://schemas.microsoft.com/office/drawing/2017/decorative" val="1"/>
+              </a:ext>
+            </a:extLst>
+          </p:cNvPr>
+          <p:cNvSpPr>
+            <a:spLocks noGrp="1" noRot="1" noChangeAspect="1" noMove="1" noResize="1" noEditPoints="1" noAdjustHandles="1" noChangeArrowheads="1" noChangeShapeType="1" noTextEdit="1"/>
+          </p:cNvSpPr>
+          <p:nvPr>
+            <p:extLst>
+              <p:ext uri="{386F3935-93C4-4BCD-93E2-E3B085C9AB24}">
+                <p16:designElem xmlns:p16="http://schemas.microsoft.com/office/powerpoint/2015/main" val="1"/>
+              </p:ext>
+            </p:extLst>
+          </p:nvPr>
+        </p:nvSpPr>
+        <p:spPr>
+          <a:xfrm rot="10800000" flipH="1">
+            <a:off x="6096642" y="0"/>
+            <a:ext cx="3047358" cy="1576412"/>
+          </a:xfrm>
+          <a:prstGeom prst="rect">
+            <a:avLst/>
+          </a:prstGeom>
+          <a:gradFill>
+            <a:gsLst>
+              <a:gs pos="19000">
+                <a:schemeClr val="accent1">
+                  <a:lumMod val="50000"/>
+                  <a:alpha val="68000"/>
+                </a:schemeClr>
+              </a:gs>
+              <a:gs pos="100000">
+                <a:schemeClr val="accent1">
+                  <a:alpha val="79000"/>
+                </a:schemeClr>
+              </a:gs>
+            </a:gsLst>
+            <a:lin ang="19200000" scaled="0"/>
+          </a:gradFill>
+          <a:ln>
+            <a:noFill/>
+          </a:ln>
+        </p:spPr>
+        <p:style>
+          <a:lnRef idx="2">
+            <a:schemeClr val="accent1">
+              <a:shade val="50000"/>
+            </a:schemeClr>
+          </a:lnRef>
+          <a:fillRef idx="1">
+            <a:schemeClr val="accent1"/>
+          </a:fillRef>
+          <a:effectRef idx="0">
+            <a:schemeClr val="accent1"/>
+          </a:effectRef>
+          <a:fontRef idx="minor">
+            <a:schemeClr val="lt1"/>
+          </a:fontRef>
+        </p:style>
+        <p:txBody>
+          <a:bodyPr rtlCol="0" anchor="ctr"/>
+          <a:lstStyle/>
+          <a:p>
+            <a:pPr algn="ctr"/>
+            <a:endParaRPr lang="en-US"/>
+          </a:p>
+        </p:txBody>
+      </p:sp>
+      <p:sp>
+        <p:nvSpPr>
+          <p:cNvPr id="15" name="Rectangle 14">
+            <a:extLst>
+              <a:ext uri="{FF2B5EF4-FFF2-40B4-BE49-F238E27FC236}">
+                <a16:creationId xmlns:a16="http://schemas.microsoft.com/office/drawing/2014/main" id="{063BBA22-50EA-4C4D-BE05-F1CE4E63AA56}"/>
+              </a:ext>
+              <a:ext uri="{C183D7F6-B498-43B3-948B-1728B52AA6E4}">
+                <adec:decorative xmlns:adec="http://schemas.microsoft.com/office/drawing/2017/decorative" val="1"/>
+              </a:ext>
+            </a:extLst>
+          </p:cNvPr>
+          <p:cNvSpPr>
+            <a:spLocks noGrp="1" noRot="1" noChangeAspect="1" noMove="1" noResize="1" noEditPoints="1" noAdjustHandles="1" noChangeArrowheads="1" noChangeShapeType="1" noTextEdit="1"/>
+          </p:cNvSpPr>
+          <p:nvPr>
+            <p:extLst>
+              <p:ext uri="{386F3935-93C4-4BCD-93E2-E3B085C9AB24}">
+                <p16:designElem xmlns:p16="http://schemas.microsoft.com/office/powerpoint/2015/main" val="1"/>
+              </p:ext>
+            </p:extLst>
+          </p:nvPr>
+        </p:nvSpPr>
+        <p:spPr>
+          <a:xfrm rot="5400000">
+            <a:off x="3783777" y="-3783778"/>
+            <a:ext cx="1576446" cy="9144002"/>
+          </a:xfrm>
+          <a:prstGeom prst="rect">
+            <a:avLst/>
+          </a:prstGeom>
+          <a:gradFill>
+            <a:gsLst>
+              <a:gs pos="23000">
+                <a:schemeClr val="accent1">
+                  <a:alpha val="0"/>
+                </a:schemeClr>
+              </a:gs>
+              <a:gs pos="99000">
+                <a:srgbClr val="000000">
+                  <a:alpha val="74000"/>
+                </a:srgbClr>
+              </a:gs>
+            </a:gsLst>
+            <a:lin ang="20400000" scaled="0"/>
+          </a:gradFill>
+          <a:ln>
+            <a:noFill/>
+          </a:ln>
+        </p:spPr>
+        <p:style>
+          <a:lnRef idx="2">
+            <a:schemeClr val="accent1">
+              <a:shade val="50000"/>
+            </a:schemeClr>
+          </a:lnRef>
+          <a:fillRef idx="1">
+            <a:schemeClr val="accent1"/>
+          </a:fillRef>
+          <a:effectRef idx="0">
+            <a:schemeClr val="accent1"/>
+          </a:effectRef>
+          <a:fontRef idx="minor">
+            <a:schemeClr val="lt1"/>
+          </a:fontRef>
+        </p:style>
+        <p:txBody>
+          <a:bodyPr rtlCol="0" anchor="ctr"/>
+          <a:lstStyle/>
+          <a:p>
+            <a:pPr algn="ctr"/>
+            <a:endParaRPr lang="en-US" dirty="0"/>
+          </a:p>
+        </p:txBody>
+      </p:sp>
+      <p:sp>
+        <p:nvSpPr>
+          <p:cNvPr id="2" name="Title 1">
+            <a:extLst>
+              <a:ext uri="{FF2B5EF4-FFF2-40B4-BE49-F238E27FC236}">
+                <a16:creationId xmlns:a16="http://schemas.microsoft.com/office/drawing/2014/main" id="{671334F7-E272-D1D2-9DE0-0CF0673286A3}"/>
+              </a:ext>
+            </a:extLst>
+          </p:cNvPr>
+          <p:cNvSpPr>
+            <a:spLocks noGrp="1"/>
+          </p:cNvSpPr>
+          <p:nvPr>
+            <p:ph type="title"/>
+          </p:nvPr>
+        </p:nvSpPr>
+        <p:spPr>
+          <a:xfrm>
+            <a:off x="1028697" y="348865"/>
+            <a:ext cx="7533018" cy="877729"/>
+          </a:xfrm>
+        </p:spPr>
+        <p:txBody>
+          <a:bodyPr anchor="ctr">
+            <a:normAutofit/>
+          </a:bodyPr>
+          <a:lstStyle/>
+          <a:p>
+            <a:r>
+              <a:rPr lang="en-US" sz="3500">
+                <a:solidFill>
+                  <a:srgbClr val="FFFFFF"/>
+                </a:solidFill>
+              </a:rPr>
+              <a:t>Project</a:t>
+            </a:r>
+            <a:r>
+              <a:rPr lang="zh-CN" altLang="en-US" sz="3500">
+                <a:solidFill>
+                  <a:srgbClr val="FFFFFF"/>
+                </a:solidFill>
+              </a:rPr>
+              <a:t> </a:t>
+            </a:r>
+            <a:r>
+              <a:rPr lang="en-US" altLang="zh-CN" sz="3500">
+                <a:solidFill>
+                  <a:srgbClr val="FFFFFF"/>
+                </a:solidFill>
+              </a:rPr>
+              <a:t>Schedule</a:t>
+            </a:r>
+            <a:endParaRPr lang="en-US" sz="3500">
+              <a:solidFill>
+                <a:srgbClr val="FFFFFF"/>
+              </a:solidFill>
+            </a:endParaRPr>
+          </a:p>
+        </p:txBody>
+      </p:sp>
+      <p:graphicFrame>
+        <p:nvGraphicFramePr>
+          <p:cNvPr id="4" name="Content Placeholder 3">
+            <a:extLst>
+              <a:ext uri="{FF2B5EF4-FFF2-40B4-BE49-F238E27FC236}">
+                <a16:creationId xmlns:a16="http://schemas.microsoft.com/office/drawing/2014/main" id="{EED13AF4-0F73-19E3-DC3F-565C3346B21A}"/>
+              </a:ext>
+            </a:extLst>
+          </p:cNvPr>
+          <p:cNvGraphicFramePr>
+            <a:graphicFrameLocks noGrp="1"/>
+          </p:cNvGraphicFramePr>
+          <p:nvPr>
+            <p:ph idx="1"/>
+            <p:extLst>
+              <p:ext uri="{D42A27DB-BD31-4B8C-83A1-F6EECF244321}">
+                <p14:modId xmlns:p14="http://schemas.microsoft.com/office/powerpoint/2010/main" val="2023656726"/>
+              </p:ext>
+            </p:extLst>
+          </p:nvPr>
+        </p:nvGraphicFramePr>
+        <p:xfrm>
+          <a:off x="795543" y="2112579"/>
+          <a:ext cx="7570869" cy="4192807"/>
+        </p:xfrm>
+        <a:graphic>
+          <a:graphicData uri="http://schemas.openxmlformats.org/drawingml/2006/table">
+            <a:tbl>
+              <a:tblPr firstRow="1" bandRow="1">
+                <a:tableStyleId>{5C22544A-7EE6-4342-B048-85BDC9FD1C3A}</a:tableStyleId>
+              </a:tblPr>
+              <a:tblGrid>
+                <a:gridCol w="1274589">
+                  <a:extLst>
+                    <a:ext uri="{9D8B030D-6E8A-4147-A177-3AD203B41FA5}">
+                      <a16:colId xmlns:a16="http://schemas.microsoft.com/office/drawing/2014/main" val="1485144315"/>
+                    </a:ext>
+                  </a:extLst>
+                </a:gridCol>
+                <a:gridCol w="2763116">
+                  <a:extLst>
+                    <a:ext uri="{9D8B030D-6E8A-4147-A177-3AD203B41FA5}">
+                      <a16:colId xmlns:a16="http://schemas.microsoft.com/office/drawing/2014/main" val="203464135"/>
+                    </a:ext>
+                  </a:extLst>
+                </a:gridCol>
+                <a:gridCol w="3533164">
+                  <a:extLst>
+                    <a:ext uri="{9D8B030D-6E8A-4147-A177-3AD203B41FA5}">
+                      <a16:colId xmlns:a16="http://schemas.microsoft.com/office/drawing/2014/main" val="1294175318"/>
+                    </a:ext>
+                  </a:extLst>
+                </a:gridCol>
+              </a:tblGrid>
+              <a:tr h="376497">
+                <a:tc>
+                  <a:txBody>
+                    <a:bodyPr/>
+                    <a:lstStyle/>
+                    <a:p>
+                      <a:pPr marL="0" algn="l" defTabSz="457200" rtl="0" eaLnBrk="1" latinLnBrk="0" hangingPunct="1"/>
+                      <a:r>
+                        <a:rPr lang="en-US" sz="1300" b="0" kern="1200" dirty="0">
+                          <a:solidFill>
+                            <a:schemeClr val="tx1"/>
+                          </a:solidFill>
+                          <a:latin typeface="+mn-lt"/>
+                          <a:ea typeface="+mn-ea"/>
+                          <a:cs typeface="+mn-cs"/>
+                        </a:rPr>
+                        <a:t>Week</a:t>
+                      </a:r>
+                    </a:p>
+                  </a:txBody>
+                  <a:tcPr marL="85567" marR="85567" marT="42784" marB="42784" anchor="ctr"/>
+                </a:tc>
+                <a:tc>
+                  <a:txBody>
+                    <a:bodyPr/>
+                    <a:lstStyle/>
+                    <a:p>
+                      <a:pPr marL="0" algn="l" defTabSz="457200" rtl="0" eaLnBrk="1" latinLnBrk="0" hangingPunct="1"/>
+                      <a:r>
+                        <a:rPr lang="en-US" sz="1300" b="0" kern="1200">
+                          <a:solidFill>
+                            <a:schemeClr val="tx1"/>
+                          </a:solidFill>
+                          <a:latin typeface="+mn-lt"/>
+                          <a:ea typeface="+mn-ea"/>
+                          <a:cs typeface="+mn-cs"/>
+                        </a:rPr>
+                        <a:t>Milestone</a:t>
+                      </a:r>
+                    </a:p>
+                  </a:txBody>
+                  <a:tcPr marL="85567" marR="85567" marT="42784" marB="42784" anchor="ctr"/>
+                </a:tc>
+                <a:tc>
+                  <a:txBody>
+                    <a:bodyPr/>
+                    <a:lstStyle/>
+                    <a:p>
+                      <a:pPr marL="0" algn="l" defTabSz="457200" rtl="0" eaLnBrk="1" latinLnBrk="0" hangingPunct="1"/>
+                      <a:r>
+                        <a:rPr lang="en-US" sz="1300" b="0" kern="1200">
+                          <a:solidFill>
+                            <a:schemeClr val="tx1"/>
+                          </a:solidFill>
+                          <a:latin typeface="+mn-lt"/>
+                          <a:ea typeface="+mn-ea"/>
+                          <a:cs typeface="+mn-cs"/>
+                        </a:rPr>
+                        <a:t>Description</a:t>
+                      </a:r>
+                    </a:p>
+                  </a:txBody>
+                  <a:tcPr marL="85567" marR="85567" marT="42784" marB="42784" anchor="ctr"/>
+                </a:tc>
+                <a:extLst>
+                  <a:ext uri="{0D108BD9-81ED-4DB2-BD59-A6C34878D82A}">
+                    <a16:rowId xmlns:a16="http://schemas.microsoft.com/office/drawing/2014/main" val="2243274571"/>
+                  </a:ext>
+                </a:extLst>
+              </a:tr>
+              <a:tr h="1146604">
+                <a:tc>
+                  <a:txBody>
+                    <a:bodyPr/>
+                    <a:lstStyle/>
+                    <a:p>
+                      <a:pPr marL="0" algn="l" defTabSz="457200" rtl="0" eaLnBrk="1" latinLnBrk="0" hangingPunct="1"/>
+                      <a:r>
+                        <a:rPr lang="en-US" sz="1300" b="0" kern="1200" dirty="0">
+                          <a:solidFill>
+                            <a:schemeClr val="tx1"/>
+                          </a:solidFill>
+                          <a:latin typeface="+mn-lt"/>
+                          <a:ea typeface="+mn-ea"/>
+                          <a:cs typeface="+mn-cs"/>
+                        </a:rPr>
+                        <a:t>1</a:t>
+                      </a:r>
+                    </a:p>
+                  </a:txBody>
+                  <a:tcPr marL="85567" marR="85567" marT="42784" marB="42784" anchor="ctr"/>
+                </a:tc>
+                <a:tc>
+                  <a:txBody>
+                    <a:bodyPr/>
+                    <a:lstStyle/>
+                    <a:p>
+                      <a:pPr marL="0" algn="l" defTabSz="457200" rtl="0" eaLnBrk="1" latinLnBrk="0" hangingPunct="1"/>
+                      <a:r>
+                        <a:rPr lang="en-US" sz="1300" b="0" kern="1200" dirty="0">
+                          <a:solidFill>
+                            <a:schemeClr val="tx1"/>
+                          </a:solidFill>
+                          <a:latin typeface="+mn-lt"/>
+                          <a:ea typeface="+mn-ea"/>
+                          <a:cs typeface="+mn-cs"/>
+                        </a:rPr>
+                        <a:t>Project Kickoff</a:t>
+                      </a:r>
+                    </a:p>
+                  </a:txBody>
+                  <a:tcPr marL="85567" marR="85567" marT="42784" marB="42784" anchor="ctr"/>
+                </a:tc>
+                <a:tc>
+                  <a:txBody>
+                    <a:bodyPr/>
+                    <a:lstStyle/>
+                    <a:p>
+                      <a:pPr marL="0" algn="l" defTabSz="457200" rtl="0" eaLnBrk="1" latinLnBrk="0" hangingPunct="1"/>
+                      <a:r>
+                        <a:rPr lang="en-US" sz="1300" b="0" kern="1200" dirty="0">
+                          <a:solidFill>
+                            <a:schemeClr val="tx1"/>
+                          </a:solidFill>
+                          <a:latin typeface="+mn-lt"/>
+                          <a:ea typeface="+mn-ea"/>
+                          <a:cs typeface="+mn-cs"/>
+                        </a:rPr>
+                        <a:t>Introduction to course project: "Your Personalized Research Agent". Define goals &amp; start experimenting with prompts.</a:t>
+                      </a:r>
+                    </a:p>
+                  </a:txBody>
+                  <a:tcPr marL="85567" marR="85567" marT="42784" marB="42784" anchor="ctr"/>
+                </a:tc>
+                <a:extLst>
+                  <a:ext uri="{0D108BD9-81ED-4DB2-BD59-A6C34878D82A}">
+                    <a16:rowId xmlns:a16="http://schemas.microsoft.com/office/drawing/2014/main" val="3968608274"/>
+                  </a:ext>
+                </a:extLst>
+              </a:tr>
+              <a:tr h="889902">
+                <a:tc>
+                  <a:txBody>
+                    <a:bodyPr/>
+                    <a:lstStyle/>
+                    <a:p>
+                      <a:pPr marL="0" algn="l" defTabSz="457200" rtl="0" eaLnBrk="1" latinLnBrk="0" hangingPunct="1"/>
+                      <a:r>
+                        <a:rPr lang="en-US" sz="1300" b="0" kern="1200">
+                          <a:solidFill>
+                            <a:schemeClr val="tx1"/>
+                          </a:solidFill>
+                          <a:latin typeface="+mn-lt"/>
+                          <a:ea typeface="+mn-ea"/>
+                          <a:cs typeface="+mn-cs"/>
+                        </a:rPr>
+                        <a:t>4</a:t>
+                      </a:r>
+                    </a:p>
+                  </a:txBody>
+                  <a:tcPr marL="85567" marR="85567" marT="42784" marB="42784" anchor="ctr"/>
+                </a:tc>
+                <a:tc>
+                  <a:txBody>
+                    <a:bodyPr/>
+                    <a:lstStyle/>
+                    <a:p>
+                      <a:pPr marL="0" algn="l" defTabSz="457200" rtl="0" eaLnBrk="1" latinLnBrk="0" hangingPunct="1"/>
+                      <a:r>
+                        <a:rPr lang="en-US" sz="1300" b="0" kern="1200" dirty="0">
+                          <a:solidFill>
+                            <a:schemeClr val="tx1"/>
+                          </a:solidFill>
+                          <a:latin typeface="+mn-lt"/>
+                          <a:ea typeface="+mn-ea"/>
+                          <a:cs typeface="+mn-cs"/>
+                        </a:rPr>
+                        <a:t>Project Insight I (TA Section)</a:t>
+                      </a:r>
+                    </a:p>
+                  </a:txBody>
+                  <a:tcPr marL="85567" marR="85567" marT="42784" marB="42784" anchor="ctr"/>
+                </a:tc>
+                <a:tc>
+                  <a:txBody>
+                    <a:bodyPr/>
+                    <a:lstStyle/>
+                    <a:p>
+                      <a:pPr marL="0" algn="l" defTabSz="457200" rtl="0" eaLnBrk="1" latinLnBrk="0" hangingPunct="1"/>
+                      <a:r>
+                        <a:rPr lang="en-US" sz="1300" b="0" kern="1200" dirty="0">
+                          <a:solidFill>
+                            <a:schemeClr val="tx1"/>
+                          </a:solidFill>
+                          <a:latin typeface="+mn-lt"/>
+                          <a:ea typeface="+mn-ea"/>
+                          <a:cs typeface="+mn-cs"/>
+                        </a:rPr>
+                        <a:t>First review of project idea. Share initial progress, receive peer/TA feedback. Adjust scope if needed.</a:t>
+                      </a:r>
+                    </a:p>
+                  </a:txBody>
+                  <a:tcPr marL="85567" marR="85567" marT="42784" marB="42784" anchor="ctr"/>
+                </a:tc>
+                <a:extLst>
+                  <a:ext uri="{0D108BD9-81ED-4DB2-BD59-A6C34878D82A}">
+                    <a16:rowId xmlns:a16="http://schemas.microsoft.com/office/drawing/2014/main" val="248535620"/>
+                  </a:ext>
+                </a:extLst>
+              </a:tr>
+              <a:tr h="889902">
+                <a:tc>
+                  <a:txBody>
+                    <a:bodyPr/>
+                    <a:lstStyle/>
+                    <a:p>
+                      <a:pPr marL="0" algn="l" defTabSz="457200" rtl="0" eaLnBrk="1" latinLnBrk="0" hangingPunct="1"/>
+                      <a:r>
+                        <a:rPr lang="en-US" sz="1300" b="0" kern="1200">
+                          <a:solidFill>
+                            <a:schemeClr val="tx1"/>
+                          </a:solidFill>
+                          <a:latin typeface="+mn-lt"/>
+                          <a:ea typeface="+mn-ea"/>
+                          <a:cs typeface="+mn-cs"/>
+                        </a:rPr>
+                        <a:t>7</a:t>
+                      </a:r>
+                    </a:p>
+                  </a:txBody>
+                  <a:tcPr marL="85567" marR="85567" marT="42784" marB="42784" anchor="ctr"/>
+                </a:tc>
+                <a:tc>
+                  <a:txBody>
+                    <a:bodyPr/>
+                    <a:lstStyle/>
+                    <a:p>
+                      <a:pPr marL="0" algn="l" defTabSz="457200" rtl="0" eaLnBrk="1" latinLnBrk="0" hangingPunct="1"/>
+                      <a:r>
+                        <a:rPr lang="en-US" sz="1300" b="0" kern="1200" dirty="0">
+                          <a:solidFill>
+                            <a:schemeClr val="tx1"/>
+                          </a:solidFill>
+                          <a:latin typeface="+mn-lt"/>
+                          <a:ea typeface="+mn-ea"/>
+                          <a:cs typeface="+mn-cs"/>
+                        </a:rPr>
+                        <a:t>Project Insight II (TA Section)</a:t>
+                      </a:r>
+                    </a:p>
+                  </a:txBody>
+                  <a:tcPr marL="85567" marR="85567" marT="42784" marB="42784" anchor="ctr"/>
+                </a:tc>
+                <a:tc>
+                  <a:txBody>
+                    <a:bodyPr/>
+                    <a:lstStyle/>
+                    <a:p>
+                      <a:pPr marL="0" algn="l" defTabSz="457200" rtl="0" eaLnBrk="1" latinLnBrk="0" hangingPunct="1"/>
+                      <a:r>
+                        <a:rPr lang="en-US" sz="1300" b="0" kern="1200" dirty="0">
+                          <a:solidFill>
+                            <a:schemeClr val="tx1"/>
+                          </a:solidFill>
+                          <a:latin typeface="+mn-lt"/>
+                          <a:ea typeface="+mn-ea"/>
+                          <a:cs typeface="+mn-cs"/>
+                        </a:rPr>
+                        <a:t>Second review checkpoint. Final decision: lock in project direction &amp; components.</a:t>
+                      </a:r>
+                    </a:p>
+                  </a:txBody>
+                  <a:tcPr marL="85567" marR="85567" marT="42784" marB="42784" anchor="ctr"/>
+                </a:tc>
+                <a:extLst>
+                  <a:ext uri="{0D108BD9-81ED-4DB2-BD59-A6C34878D82A}">
+                    <a16:rowId xmlns:a16="http://schemas.microsoft.com/office/drawing/2014/main" val="1170386605"/>
+                  </a:ext>
+                </a:extLst>
+              </a:tr>
+              <a:tr h="889902">
+                <a:tc>
+                  <a:txBody>
+                    <a:bodyPr/>
+                    <a:lstStyle/>
+                    <a:p>
+                      <a:pPr marL="0" algn="l" defTabSz="457200" rtl="0" eaLnBrk="1" latinLnBrk="0" hangingPunct="1"/>
+                      <a:r>
+                        <a:rPr lang="en-US" sz="1300" b="0" kern="1200">
+                          <a:solidFill>
+                            <a:schemeClr val="tx1"/>
+                          </a:solidFill>
+                          <a:latin typeface="+mn-lt"/>
+                          <a:ea typeface="+mn-ea"/>
+                          <a:cs typeface="+mn-cs"/>
+                        </a:rPr>
+                        <a:t>10</a:t>
+                      </a:r>
+                    </a:p>
+                  </a:txBody>
+                  <a:tcPr marL="85567" marR="85567" marT="42784" marB="42784" anchor="ctr"/>
+                </a:tc>
+                <a:tc>
+                  <a:txBody>
+                    <a:bodyPr/>
+                    <a:lstStyle/>
+                    <a:p>
+                      <a:pPr marL="0" algn="l" defTabSz="457200" rtl="0" eaLnBrk="1" latinLnBrk="0" hangingPunct="1"/>
+                      <a:r>
+                        <a:rPr lang="en-US" sz="1300" b="0" kern="1200">
+                          <a:solidFill>
+                            <a:schemeClr val="tx1"/>
+                          </a:solidFill>
+                          <a:latin typeface="+mn-lt"/>
+                          <a:ea typeface="+mn-ea"/>
+                          <a:cs typeface="+mn-cs"/>
+                        </a:rPr>
+                        <a:t>Final Presentation</a:t>
+                      </a:r>
+                    </a:p>
+                  </a:txBody>
+                  <a:tcPr marL="85567" marR="85567" marT="42784" marB="42784" anchor="ctr"/>
+                </a:tc>
+                <a:tc>
+                  <a:txBody>
+                    <a:bodyPr/>
+                    <a:lstStyle/>
+                    <a:p>
+                      <a:pPr marL="0" algn="l" defTabSz="457200" rtl="0" eaLnBrk="1" latinLnBrk="0" hangingPunct="1"/>
+                      <a:r>
+                        <a:rPr lang="en-US" sz="1300" b="0" kern="1200" dirty="0">
+                          <a:solidFill>
+                            <a:schemeClr val="tx1"/>
+                          </a:solidFill>
+                          <a:latin typeface="+mn-lt"/>
+                          <a:ea typeface="+mn-ea"/>
+                          <a:cs typeface="+mn-cs"/>
+                        </a:rPr>
+                        <a:t>Present your working agent: share learnings, showcase demo, and reflect on technical depth.</a:t>
+                      </a:r>
+                    </a:p>
+                  </a:txBody>
+                  <a:tcPr marL="85567" marR="85567" marT="42784" marB="42784" anchor="ctr"/>
+                </a:tc>
+                <a:extLst>
+                  <a:ext uri="{0D108BD9-81ED-4DB2-BD59-A6C34878D82A}">
+                    <a16:rowId xmlns:a16="http://schemas.microsoft.com/office/drawing/2014/main" val="349434800"/>
+                  </a:ext>
+                </a:extLst>
+              </a:tr>
+            </a:tbl>
+          </a:graphicData>
+        </a:graphic>
+      </p:graphicFrame>
+    </p:spTree>
+    <p:extLst>
+      <p:ext uri="{BB962C8B-B14F-4D97-AF65-F5344CB8AC3E}">
+        <p14:creationId xmlns:p14="http://schemas.microsoft.com/office/powerpoint/2010/main" val="3873908252"/>
+      </p:ext>
+    </p:extLst>
+  </p:cSld>
+  <p:clrMapOvr>
+    <a:masterClrMapping/>
+  </p:clrMapOvr>
+</p:sld>
+</file>
+
+<file path=ppt/slides/slide2.xml><?xml version="1.0" encoding="utf-8"?>
+<p:sld xmlns:a="http://schemas.openxmlformats.org/drawingml/2006/main" xmlns:r="http://schemas.openxmlformats.org/officeDocument/2006/relationships" xmlns:p="http://schemas.openxmlformats.org/presentationml/2006/main">
+  <p:cSld>
+    <p:spTree>
+      <p:nvGrpSpPr>
+        <p:cNvPr id="1" name=""/>
+        <p:cNvGrpSpPr/>
+        <p:nvPr/>
+      </p:nvGrpSpPr>
+      <p:grpSpPr>
+        <a:xfrm>
+          <a:off x="0" y="0"/>
+          <a:ext cx="0" cy="0"/>
+          <a:chOff x="0" y="0"/>
+          <a:chExt cx="0" cy="0"/>
+        </a:xfrm>
+      </p:grpSpPr>
+      <p:sp>
+        <p:nvSpPr>
+          <p:cNvPr id="2" name="Title 1">
+            <a:extLst>
+              <a:ext uri="{FF2B5EF4-FFF2-40B4-BE49-F238E27FC236}">
+                <a16:creationId xmlns:a16="http://schemas.microsoft.com/office/drawing/2014/main" id="{1B772A76-4225-5FF4-A08C-2FED5984D6AE}"/>
+              </a:ext>
+            </a:extLst>
+          </p:cNvPr>
+          <p:cNvSpPr>
+            <a:spLocks noGrp="1"/>
+          </p:cNvSpPr>
+          <p:nvPr>
+            <p:ph type="title"/>
+          </p:nvPr>
+        </p:nvSpPr>
+        <p:spPr>
+          <a:xfrm>
+            <a:off x="457200" y="362321"/>
+            <a:ext cx="8229600" cy="1143000"/>
+          </a:xfrm>
+        </p:spPr>
+        <p:txBody>
+          <a:bodyPr/>
+          <a:lstStyle/>
+          <a:p>
+            <a:r>
+              <a:rPr lang="en-US" dirty="0"/>
+              <a:t>Course Structure</a:t>
+            </a:r>
+          </a:p>
+        </p:txBody>
+      </p:sp>
+      <p:graphicFrame>
+        <p:nvGraphicFramePr>
+          <p:cNvPr id="5" name="Content Placeholder 2">
+            <a:extLst>
+              <a:ext uri="{FF2B5EF4-FFF2-40B4-BE49-F238E27FC236}">
+                <a16:creationId xmlns:a16="http://schemas.microsoft.com/office/drawing/2014/main" id="{BFA8B3C3-7FC8-1690-F119-E380AB51EA81}"/>
+              </a:ext>
+            </a:extLst>
+          </p:cNvPr>
+          <p:cNvGraphicFramePr>
+            <a:graphicFrameLocks noGrp="1"/>
+          </p:cNvGraphicFramePr>
+          <p:nvPr>
+            <p:ph idx="1"/>
+            <p:extLst>
+              <p:ext uri="{D42A27DB-BD31-4B8C-83A1-F6EECF244321}">
+                <p14:modId xmlns:p14="http://schemas.microsoft.com/office/powerpoint/2010/main" val="3711356675"/>
+              </p:ext>
+            </p:extLst>
+          </p:nvPr>
+        </p:nvGraphicFramePr>
+        <p:xfrm>
+          <a:off x="457200" y="1600200"/>
+          <a:ext cx="8229600" cy="4525963"/>
+        </p:xfrm>
+        <a:graphic>
+          <a:graphicData uri="http://schemas.openxmlformats.org/drawingml/2006/diagram">
+            <dgm:relIds xmlns:dgm="http://schemas.openxmlformats.org/drawingml/2006/diagram" xmlns:r="http://schemas.openxmlformats.org/officeDocument/2006/relationships" r:dm="rId3" r:lo="rId4" r:qs="rId5" r:cs="rId6"/>
+          </a:graphicData>
+        </a:graphic>
+      </p:graphicFrame>
+    </p:spTree>
+    <p:extLst>
+      <p:ext uri="{BB962C8B-B14F-4D97-AF65-F5344CB8AC3E}">
+        <p14:creationId xmlns:p14="http://schemas.microsoft.com/office/powerpoint/2010/main" val="1943629503"/>
+      </p:ext>
+    </p:extLst>
+  </p:cSld>
+  <p:clrMapOvr>
+    <a:masterClrMapping/>
+  </p:clrMapOvr>
+</p:sld>
+</file>
+
+<file path=ppt/slides/slide20.xml><?xml version="1.0" encoding="utf-8"?>
+<p:sld xmlns:a="http://schemas.openxmlformats.org/drawingml/2006/main" xmlns:r="http://schemas.openxmlformats.org/officeDocument/2006/relationships" xmlns:p="http://schemas.openxmlformats.org/presentationml/2006/main">
+  <p:cSld>
+    <p:spTree>
+      <p:nvGrpSpPr>
+        <p:cNvPr id="1" name=""/>
+        <p:cNvGrpSpPr/>
+        <p:nvPr/>
+      </p:nvGrpSpPr>
+      <p:grpSpPr>
+        <a:xfrm>
+          <a:off x="0" y="0"/>
+          <a:ext cx="0" cy="0"/>
+          <a:chOff x="0" y="0"/>
+          <a:chExt cx="0" cy="0"/>
+        </a:xfrm>
+      </p:grpSpPr>
+      <p:sp>
+        <p:nvSpPr>
+          <p:cNvPr id="2" name="Title 1">
+            <a:extLst>
+              <a:ext uri="{FF2B5EF4-FFF2-40B4-BE49-F238E27FC236}">
+                <a16:creationId xmlns:a16="http://schemas.microsoft.com/office/drawing/2014/main" id="{A572F522-693A-9999-BBFD-86226C36159D}"/>
+              </a:ext>
+            </a:extLst>
+          </p:cNvPr>
+          <p:cNvSpPr>
+            <a:spLocks noGrp="1"/>
+          </p:cNvSpPr>
+          <p:nvPr>
+            <p:ph type="title"/>
+          </p:nvPr>
+        </p:nvSpPr>
+        <p:spPr/>
+        <p:txBody>
+          <a:bodyPr/>
+          <a:lstStyle/>
+          <a:p>
+            <a:r>
+              <a:rPr lang="en-US" dirty="0"/>
+              <a:t>Kickstart of Your Project</a:t>
+            </a:r>
+          </a:p>
+        </p:txBody>
+      </p:sp>
+      <p:sp>
+        <p:nvSpPr>
+          <p:cNvPr id="3" name="Content Placeholder 2">
+            <a:extLst>
+              <a:ext uri="{FF2B5EF4-FFF2-40B4-BE49-F238E27FC236}">
+                <a16:creationId xmlns:a16="http://schemas.microsoft.com/office/drawing/2014/main" id="{B923E1C8-7AC9-123C-AA33-E6C40CFF78F4}"/>
+              </a:ext>
+            </a:extLst>
+          </p:cNvPr>
+          <p:cNvSpPr>
+            <a:spLocks noGrp="1"/>
+          </p:cNvSpPr>
+          <p:nvPr>
+            <p:ph idx="1"/>
+          </p:nvPr>
+        </p:nvSpPr>
+        <p:spPr/>
+        <p:txBody>
+          <a:bodyPr>
+            <a:normAutofit fontScale="55000" lnSpcReduction="20000"/>
+          </a:bodyPr>
+          <a:lstStyle/>
+          <a:p>
+            <a:r>
+              <a:rPr lang="en-US" b="1" dirty="0"/>
+              <a:t>Explore Use Cases</a:t>
+            </a:r>
+            <a:br>
+              <a:rPr lang="en-US" dirty="0"/>
+            </a:br>
+            <a:r>
+              <a:rPr lang="en-US" dirty="0"/>
+              <a:t>Investigate real-world research agents (e.g., paper summarizers, citation tools, QA systems). Brainstorm how LLMs can boost your own research workflows.</a:t>
+            </a:r>
+          </a:p>
+          <a:p>
+            <a:r>
+              <a:rPr lang="en-US" b="1" dirty="0"/>
+              <a:t>Define Your Agent’s Goal</a:t>
+            </a:r>
+            <a:br>
+              <a:rPr lang="en-US" dirty="0"/>
+            </a:br>
+            <a:r>
+              <a:rPr lang="en-US" dirty="0"/>
+              <a:t>Write a 1-sentence mission:</a:t>
+            </a:r>
+            <a:br>
+              <a:rPr lang="en-US" dirty="0"/>
+            </a:br>
+            <a:r>
+              <a:rPr lang="en-US" i="1" dirty="0"/>
+              <a:t>“My agent helps me [task] by [method].”</a:t>
+            </a:r>
+            <a:endParaRPr lang="en-US" dirty="0"/>
+          </a:p>
+          <a:p>
+            <a:r>
+              <a:rPr lang="en-US" b="1" dirty="0"/>
+              <a:t>Start Prompt Engineering</a:t>
+            </a:r>
+            <a:br>
+              <a:rPr lang="en-US" dirty="0"/>
+            </a:br>
+            <a:r>
+              <a:rPr lang="en-US" dirty="0"/>
+              <a:t>Design your first prompt using CO-STAR and chain-of-thought techniques.</a:t>
+            </a:r>
+            <a:br>
+              <a:rPr lang="en-US" dirty="0"/>
+            </a:br>
+            <a:r>
+              <a:rPr lang="en-US" dirty="0"/>
+              <a:t>Format output with JSON/XML for structured results.</a:t>
+            </a:r>
+          </a:p>
+          <a:p>
+            <a:r>
+              <a:rPr lang="en-US" b="1" dirty="0"/>
+              <a:t>Join Discord &amp; Collaborate</a:t>
+            </a:r>
+            <a:br>
+              <a:rPr lang="en-US" dirty="0"/>
+            </a:br>
+            <a:r>
+              <a:rPr lang="en-US" dirty="0"/>
+              <a:t>Introduce yourself. Share your agent idea. Join a feedback group.</a:t>
+            </a:r>
+          </a:p>
+          <a:p>
+            <a:r>
+              <a:rPr lang="en-US" b="1" dirty="0"/>
+              <a:t>Study Examples</a:t>
+            </a:r>
+            <a:br>
+              <a:rPr lang="en-US" dirty="0"/>
+            </a:br>
+            <a:r>
+              <a:rPr lang="en-US" dirty="0"/>
+              <a:t>Review prompt demos &amp; agent walkthroughs. Note what works — and what doesn’t.</a:t>
+            </a:r>
+          </a:p>
+          <a:p>
+            <a:r>
+              <a:rPr lang="en-US" b="1" dirty="0"/>
+              <a:t>Track Model Limitations</a:t>
+            </a:r>
+            <a:br>
+              <a:rPr lang="en-US" dirty="0"/>
+            </a:br>
+            <a:r>
+              <a:rPr lang="en-US" dirty="0"/>
+              <a:t>Record hallucinations, logic gaps, or failures — these will shape your future projects (RAG, SFT, alignment).</a:t>
+            </a:r>
+          </a:p>
+        </p:txBody>
+      </p:sp>
+    </p:spTree>
+    <p:extLst>
+      <p:ext uri="{BB962C8B-B14F-4D97-AF65-F5344CB8AC3E}">
+        <p14:creationId xmlns:p14="http://schemas.microsoft.com/office/powerpoint/2010/main" val="4110110815"/>
+      </p:ext>
+    </p:extLst>
+  </p:cSld>
+  <p:clrMapOvr>
+    <a:masterClrMapping/>
+  </p:clrMapOvr>
+</p:sld>
+</file>
+
+<file path=ppt/slides/slide21.xml><?xml version="1.0" encoding="utf-8"?>
+<p:sld xmlns:a="http://schemas.openxmlformats.org/drawingml/2006/main" xmlns:r="http://schemas.openxmlformats.org/officeDocument/2006/relationships" xmlns:p="http://schemas.openxmlformats.org/presentationml/2006/main">
+  <p:cSld>
+    <p:bg>
+      <p:bgPr>
+        <a:solidFill>
+          <a:schemeClr val="bg1"/>
+        </a:solidFill>
+        <a:effectLst/>
+      </p:bgPr>
+    </p:bg>
+    <p:spTree>
+      <p:nvGrpSpPr>
+        <p:cNvPr id="1" name=""/>
+        <p:cNvGrpSpPr/>
+        <p:nvPr/>
+      </p:nvGrpSpPr>
+      <p:grpSpPr>
+        <a:xfrm>
+          <a:off x="0" y="0"/>
+          <a:ext cx="0" cy="0"/>
+          <a:chOff x="0" y="0"/>
+          <a:chExt cx="0" cy="0"/>
+        </a:xfrm>
+      </p:grpSpPr>
+      <p:sp useBgFill="1">
+        <p:nvSpPr>
           <p:cNvPr id="8" name="Rectangle 7">
             <a:extLst>
               <a:ext uri="{FF2B5EF4-FFF2-40B4-BE49-F238E27FC236}">
@@ -32643,101 +33806,7 @@
 </p:sld>
 </file>
 
-<file path=ppt/slides/slide2.xml><?xml version="1.0" encoding="utf-8"?>
-<p:sld xmlns:a="http://schemas.openxmlformats.org/drawingml/2006/main" xmlns:r="http://schemas.openxmlformats.org/officeDocument/2006/relationships" xmlns:p="http://schemas.openxmlformats.org/presentationml/2006/main">
-  <p:cSld>
-    <p:spTree>
-      <p:nvGrpSpPr>
-        <p:cNvPr id="1" name=""/>
-        <p:cNvGrpSpPr/>
-        <p:nvPr/>
-      </p:nvGrpSpPr>
-      <p:grpSpPr>
-        <a:xfrm>
-          <a:off x="0" y="0"/>
-          <a:ext cx="0" cy="0"/>
-          <a:chOff x="0" y="0"/>
-          <a:chExt cx="0" cy="0"/>
-        </a:xfrm>
-      </p:grpSpPr>
-      <p:sp>
-        <p:nvSpPr>
-          <p:cNvPr id="2" name="Title 1">
-            <a:extLst>
-              <a:ext uri="{FF2B5EF4-FFF2-40B4-BE49-F238E27FC236}">
-                <a16:creationId xmlns:a16="http://schemas.microsoft.com/office/drawing/2014/main" id="{1B772A76-4225-5FF4-A08C-2FED5984D6AE}"/>
-              </a:ext>
-            </a:extLst>
-          </p:cNvPr>
-          <p:cNvSpPr>
-            <a:spLocks noGrp="1"/>
-          </p:cNvSpPr>
-          <p:nvPr>
-            <p:ph type="title"/>
-          </p:nvPr>
-        </p:nvSpPr>
-        <p:spPr>
-          <a:xfrm>
-            <a:off x="457200" y="362321"/>
-            <a:ext cx="8229600" cy="1143000"/>
-          </a:xfrm>
-        </p:spPr>
-        <p:txBody>
-          <a:bodyPr/>
-          <a:lstStyle/>
-          <a:p>
-            <a:r>
-              <a:rPr lang="en-US" dirty="0"/>
-              <a:t>Course Structure</a:t>
-            </a:r>
-          </a:p>
-        </p:txBody>
-      </p:sp>
-      <p:graphicFrame>
-        <p:nvGraphicFramePr>
-          <p:cNvPr id="5" name="Content Placeholder 2">
-            <a:extLst>
-              <a:ext uri="{FF2B5EF4-FFF2-40B4-BE49-F238E27FC236}">
-                <a16:creationId xmlns:a16="http://schemas.microsoft.com/office/drawing/2014/main" id="{BFA8B3C3-7FC8-1690-F119-E380AB51EA81}"/>
-              </a:ext>
-            </a:extLst>
-          </p:cNvPr>
-          <p:cNvGraphicFramePr>
-            <a:graphicFrameLocks noGrp="1"/>
-          </p:cNvGraphicFramePr>
-          <p:nvPr>
-            <p:ph idx="1"/>
-            <p:extLst>
-              <p:ext uri="{D42A27DB-BD31-4B8C-83A1-F6EECF244321}">
-                <p14:modId xmlns:p14="http://schemas.microsoft.com/office/powerpoint/2010/main" val="3711356675"/>
-              </p:ext>
-            </p:extLst>
-          </p:nvPr>
-        </p:nvGraphicFramePr>
-        <p:xfrm>
-          <a:off x="457200" y="1600200"/>
-          <a:ext cx="8229600" cy="4525963"/>
-        </p:xfrm>
-        <a:graphic>
-          <a:graphicData uri="http://schemas.openxmlformats.org/drawingml/2006/diagram">
-            <dgm:relIds xmlns:dgm="http://schemas.openxmlformats.org/drawingml/2006/diagram" xmlns:r="http://schemas.openxmlformats.org/officeDocument/2006/relationships" r:dm="rId3" r:lo="rId4" r:qs="rId5" r:cs="rId6"/>
-          </a:graphicData>
-        </a:graphic>
-      </p:graphicFrame>
-    </p:spTree>
-    <p:extLst>
-      <p:ext uri="{BB962C8B-B14F-4D97-AF65-F5344CB8AC3E}">
-        <p14:creationId xmlns:p14="http://schemas.microsoft.com/office/powerpoint/2010/main" val="1943629503"/>
-      </p:ext>
-    </p:extLst>
-  </p:cSld>
-  <p:clrMapOvr>
-    <a:masterClrMapping/>
-  </p:clrMapOvr>
-</p:sld>
-</file>
-
-<file path=ppt/slides/slide20.xml><?xml version="1.0" encoding="utf-8"?>
+<file path=ppt/slides/slide22.xml><?xml version="1.0" encoding="utf-8"?>
 <p:sld xmlns:a="http://schemas.openxmlformats.org/drawingml/2006/main" xmlns:r="http://schemas.openxmlformats.org/officeDocument/2006/relationships" xmlns:p="http://schemas.openxmlformats.org/presentationml/2006/main">
   <p:cSld>
     <p:bg>
@@ -33085,6 +34154,23 @@
                 </a:solidFill>
               </a:rPr>
               <a:t>Setup MCP server in your local</a:t>
+            </a:r>
+          </a:p>
+          <a:p>
+            <a:pPr>
+              <a:buFont typeface="Arial" panose="020B0604020202020204" pitchFamily="34" charset="0"/>
+              <a:buChar char="•"/>
+            </a:pPr>
+            <a:r>
+              <a:rPr lang="en-US" sz="1700" dirty="0">
+                <a:solidFill>
+                  <a:schemeClr val="tx1">
+                    <a:lumMod val="65000"/>
+                    <a:lumOff val="35000"/>
+                  </a:schemeClr>
+                </a:solidFill>
+              </a:rPr>
+              <a:t>Write a 1-sentence project idea and share in the Discord group </a:t>
             </a:r>
           </a:p>
           <a:p>
@@ -33978,14 +35064,14 @@
           <p:nvPr>
             <p:extLst>
               <p:ext uri="{D42A27DB-BD31-4B8C-83A1-F6EECF244321}">
-                <p14:modId xmlns:p14="http://schemas.microsoft.com/office/powerpoint/2010/main" val="1354886638"/>
+                <p14:modId xmlns:p14="http://schemas.microsoft.com/office/powerpoint/2010/main" val="291361283"/>
               </p:ext>
             </p:extLst>
           </p:nvPr>
         </p:nvGraphicFramePr>
         <p:xfrm>
           <a:off x="627508" y="2646693"/>
-          <a:ext cx="7886698" cy="3542072"/>
+          <a:ext cx="7886698" cy="3763012"/>
         </p:xfrm>
         <a:graphic>
           <a:graphicData uri="http://schemas.openxmlformats.org/drawingml/2006/table">
@@ -34793,6 +35879,119 @@
                   </a:ext>
                 </a:extLst>
               </a:tr>
+              <a:tr h="565496">
+                <a:tc>
+                  <a:txBody>
+                    <a:bodyPr/>
+                    <a:lstStyle/>
+                    <a:p>
+                      <a:pPr algn="l"/>
+                      <a:r>
+                        <a:rPr lang="en-US" sz="1000" dirty="0">
+                          <a:solidFill>
+                            <a:schemeClr val="tx1"/>
+                          </a:solidFill>
+                          <a:latin typeface="Times New Roman" panose="02020603050405020304" pitchFamily="18" charset="0"/>
+                          <a:cs typeface="Times New Roman" panose="02020603050405020304" pitchFamily="18" charset="0"/>
+                        </a:rPr>
+                        <a:t>Project insight II</a:t>
+                      </a:r>
+                    </a:p>
+                  </a:txBody>
+                  <a:tcPr marL="55101" marR="55101" marT="27550" marB="27550" anchor="ctr">
+                    <a:solidFill>
+                      <a:schemeClr val="tx2">
+                        <a:lumMod val="40000"/>
+                        <a:lumOff val="60000"/>
+                      </a:schemeClr>
+                    </a:solidFill>
+                  </a:tcPr>
+                </a:tc>
+                <a:tc gridSpan="3">
+                  <a:txBody>
+                    <a:bodyPr/>
+                    <a:lstStyle/>
+                    <a:p>
+                      <a:pPr marL="65088" indent="0" algn="ctr">
+                        <a:tabLst/>
+                      </a:pPr>
+                      <a:r>
+                        <a:rPr lang="en-US" sz="1000" dirty="0">
+                          <a:solidFill>
+                            <a:schemeClr val="tx1"/>
+                          </a:solidFill>
+                          <a:latin typeface="Times New Roman" panose="02020603050405020304" pitchFamily="18" charset="0"/>
+                          <a:cs typeface="Times New Roman" panose="02020603050405020304" pitchFamily="18" charset="0"/>
+                        </a:rPr>
+                        <a:t>Decide what project you will work on</a:t>
+                      </a:r>
+                    </a:p>
+                  </a:txBody>
+                  <a:tcPr marL="55101" marR="55101" marT="27550" marB="27550" anchor="ctr">
+                    <a:solidFill>
+                      <a:schemeClr val="tx2">
+                        <a:lumMod val="40000"/>
+                        <a:lumOff val="60000"/>
+                      </a:schemeClr>
+                    </a:solidFill>
+                  </a:tcPr>
+                </a:tc>
+                <a:tc hMerge="1">
+                  <a:txBody>
+                    <a:bodyPr/>
+                    <a:lstStyle/>
+                    <a:p>
+                      <a:pPr marL="65088" indent="0" algn="l">
+                        <a:tabLst/>
+                      </a:pPr>
+                      <a:endParaRPr lang="en-US" sz="1000" dirty="0">
+                        <a:solidFill>
+                          <a:schemeClr val="tx1"/>
+                        </a:solidFill>
+                        <a:latin typeface="Times New Roman" panose="02020603050405020304" pitchFamily="18" charset="0"/>
+                        <a:cs typeface="Times New Roman" panose="02020603050405020304" pitchFamily="18" charset="0"/>
+                      </a:endParaRPr>
+                    </a:p>
+                  </a:txBody>
+                  <a:tcPr marL="55101" marR="55101" marT="27550" marB="27550" anchor="ctr">
+                    <a:solidFill>
+                      <a:schemeClr val="bg1">
+                        <a:lumMod val="85000"/>
+                      </a:schemeClr>
+                    </a:solidFill>
+                  </a:tcPr>
+                </a:tc>
+                <a:tc hMerge="1">
+                  <a:txBody>
+                    <a:bodyPr/>
+                    <a:lstStyle/>
+                    <a:p>
+                      <a:pPr marL="65088" indent="0" algn="l">
+                        <a:tabLst/>
+                      </a:pPr>
+                      <a:endParaRPr lang="en-US" sz="1000" dirty="0">
+                        <a:solidFill>
+                          <a:schemeClr val="tx1"/>
+                        </a:solidFill>
+                        <a:latin typeface="Times New Roman" panose="02020603050405020304" pitchFamily="18" charset="0"/>
+                        <a:cs typeface="Times New Roman" panose="02020603050405020304" pitchFamily="18" charset="0"/>
+                      </a:endParaRPr>
+                    </a:p>
+                  </a:txBody>
+                  <a:tcPr marL="55101" marR="55101" marT="27550" marB="27550" anchor="ctr">
+                    <a:solidFill>
+                      <a:schemeClr val="bg1">
+                        <a:lumMod val="85000"/>
+                      </a:schemeClr>
+                    </a:solidFill>
+                  </a:tcPr>
+                </a:tc>
+                <a:extLst>
+                  <a:ext uri="{0D108BD9-81ED-4DB2-BD59-A6C34878D82A}">
+                    <a16:rowId xmlns:a16="http://schemas.microsoft.com/office/drawing/2014/main" val="2388182244"/>
+                  </a:ext>
+                </a:extLst>
+              </a:tr>
               <a:tr h="550553">
                 <a:tc>
                   <a:txBody>
@@ -34903,107 +36102,6 @@
                 <a:extLst>
                   <a:ext uri="{0D108BD9-81ED-4DB2-BD59-A6C34878D82A}">
                     <a16:rowId xmlns:a16="http://schemas.microsoft.com/office/drawing/2014/main" val="2054408640"/>
-                  </a:ext>
-                </a:extLst>
-              </a:tr>
-              <a:tr h="344556">
-                <a:tc>
-                  <a:txBody>
-                    <a:bodyPr/>
-                    <a:lstStyle/>
-                    <a:p>
-                      <a:pPr algn="l"/>
-                      <a:r>
-                        <a:rPr lang="en-US" sz="1000" dirty="0">
-                          <a:solidFill>
-                            <a:schemeClr val="tx1"/>
-                          </a:solidFill>
-                          <a:latin typeface="Times New Roman" panose="02020603050405020304" pitchFamily="18" charset="0"/>
-                          <a:cs typeface="Times New Roman" panose="02020603050405020304" pitchFamily="18" charset="0"/>
-                        </a:rPr>
-                        <a:t>Project insight II</a:t>
-                      </a:r>
-                    </a:p>
-                  </a:txBody>
-                  <a:tcPr marL="55101" marR="55101" marT="27550" marB="27550" anchor="ctr">
-                    <a:solidFill>
-                      <a:schemeClr val="tx2">
-                        <a:lumMod val="40000"/>
-                        <a:lumOff val="60000"/>
-                      </a:schemeClr>
-                    </a:solidFill>
-                  </a:tcPr>
-                </a:tc>
-                <a:tc gridSpan="3">
-                  <a:txBody>
-                    <a:bodyPr/>
-                    <a:lstStyle/>
-                    <a:p>
-                      <a:pPr marL="65088" indent="0" algn="ctr">
-                        <a:tabLst/>
-                      </a:pPr>
-                      <a:r>
-                        <a:rPr lang="en-US" sz="1000" dirty="0">
-                          <a:solidFill>
-                            <a:schemeClr val="tx1"/>
-                          </a:solidFill>
-                          <a:latin typeface="Times New Roman" panose="02020603050405020304" pitchFamily="18" charset="0"/>
-                          <a:cs typeface="Times New Roman" panose="02020603050405020304" pitchFamily="18" charset="0"/>
-                        </a:rPr>
-                        <a:t>Decide what project you will work on</a:t>
-                      </a:r>
-                    </a:p>
-                  </a:txBody>
-                  <a:tcPr marL="55101" marR="55101" marT="27550" marB="27550" anchor="ctr">
-                    <a:solidFill>
-                      <a:schemeClr val="tx2">
-                        <a:lumMod val="40000"/>
-                        <a:lumOff val="60000"/>
-                      </a:schemeClr>
-                    </a:solidFill>
-                  </a:tcPr>
-                </a:tc>
-                <a:tc hMerge="1">
-                  <a:txBody>
-                    <a:bodyPr/>
-                    <a:lstStyle/>
-                    <a:p>
-                      <a:pPr marL="65088" indent="0" algn="l">
-                        <a:tabLst/>
-                      </a:pPr>
-                      <a:endParaRPr lang="en-US" sz="1000" dirty="0">
-                        <a:solidFill>
-                          <a:schemeClr val="tx1"/>
-                        </a:solidFill>
-                        <a:latin typeface="Times New Roman" panose="02020603050405020304" pitchFamily="18" charset="0"/>
-                        <a:cs typeface="Times New Roman" panose="02020603050405020304" pitchFamily="18" charset="0"/>
-                      </a:endParaRPr>
-                    </a:p>
-                  </a:txBody>
-                  <a:tcPr marL="55101" marR="55101" marT="27550" marB="27550" anchor="ctr"/>
-                </a:tc>
-                <a:tc hMerge="1">
-                  <a:txBody>
-                    <a:bodyPr/>
-                    <a:lstStyle/>
-                    <a:p>
-                      <a:pPr marL="65088" indent="0" algn="l">
-                        <a:tabLst/>
-                      </a:pPr>
-                      <a:endParaRPr lang="en-US" sz="1000" dirty="0">
-                        <a:solidFill>
-                          <a:schemeClr val="tx1"/>
-                        </a:solidFill>
-                        <a:latin typeface="Times New Roman" panose="02020603050405020304" pitchFamily="18" charset="0"/>
-                        <a:cs typeface="Times New Roman" panose="02020603050405020304" pitchFamily="18" charset="0"/>
-                      </a:endParaRPr>
-                    </a:p>
-                  </a:txBody>
-                  <a:tcPr marL="55101" marR="55101" marT="27550" marB="27550" anchor="ctr"/>
-                </a:tc>
-                <a:extLst>
-                  <a:ext uri="{0D108BD9-81ED-4DB2-BD59-A6C34878D82A}">
-                    <a16:rowId xmlns:a16="http://schemas.microsoft.com/office/drawing/2014/main" val="1119835494"/>
                   </a:ext>
                 </a:extLst>
               </a:tr>
@@ -35197,7 +36295,7 @@
           <p:nvPr>
             <p:extLst>
               <p:ext uri="{D42A27DB-BD31-4B8C-83A1-F6EECF244321}">
-                <p14:modId xmlns:p14="http://schemas.microsoft.com/office/powerpoint/2010/main" val="2545899453"/>
+                <p14:modId xmlns:p14="http://schemas.microsoft.com/office/powerpoint/2010/main" val="2260995457"/>
               </p:ext>
             </p:extLst>
           </p:nvPr>
@@ -35247,10 +36345,10 @@
                     <a:lstStyle/>
                     <a:p>
                       <a:r>
-                        <a:rPr lang="en-US" sz="1300" b="1"/>
+                        <a:rPr lang="en-US" sz="1300" b="1" dirty="0"/>
                         <a:t>Week</a:t>
                       </a:r>
-                      <a:endParaRPr lang="en-US" sz="1300"/>
+                      <a:endParaRPr lang="en-US" sz="1300" dirty="0"/>
                     </a:p>
                   </a:txBody>
                   <a:tcPr marL="67162" marR="67162" marT="33581" marB="33581" anchor="ctr">
@@ -35393,7 +36491,7 @@
                     <a:lstStyle/>
                     <a:p>
                       <a:r>
-                        <a:rPr lang="en-US" sz="1300"/>
+                        <a:rPr lang="en-US" sz="1300" dirty="0"/>
                         <a:t>Voice Agent (Multimodal AI, GPT-4o, ASR/TTS)</a:t>
                       </a:r>
                     </a:p>

</xml_diff>